<commit_message>
Exporting entities, views, cleaning up code
</commit_message>
<xml_diff>
--- a/prepro_concepts.pptx
+++ b/prepro_concepts.pptx
@@ -5,11 +5,12 @@
     <p:sldMasterId id="2147483648" r:id="rId1"/>
   </p:sldMasterIdLst>
   <p:notesMasterIdLst>
-    <p:notesMasterId r:id="rId4"/>
+    <p:notesMasterId r:id="rId5"/>
   </p:notesMasterIdLst>
   <p:sldIdLst>
     <p:sldId id="291" r:id="rId2"/>
-    <p:sldId id="294" r:id="rId3"/>
+    <p:sldId id="295" r:id="rId3"/>
+    <p:sldId id="294" r:id="rId4"/>
   </p:sldIdLst>
   <p:sldSz cx="9144000" cy="6858000" type="screen4x3"/>
   <p:notesSz cx="6858000" cy="9144000"/>
@@ -210,7 +211,7 @@
             <a:fld id="{3FBF535A-5D01-422B-B33C-D96946B05BB0}" type="datetimeFigureOut">
               <a:rPr lang="en-US" smtClean="0"/>
               <a:pPr/>
-              <a:t>1/12/2022</a:t>
+              <a:t>1/14/2022</a:t>
             </a:fld>
             <a:endParaRPr lang="en-US"/>
           </a:p>
@@ -2411,10 +2412,10 @@
       </p:grpSpPr>
       <p:pic>
         <p:nvPicPr>
-          <p:cNvPr id="12" name="Content Placeholder 11">
+          <p:cNvPr id="5" name="Content Placeholder 4">
             <a:extLst>
               <a:ext uri="{FF2B5EF4-FFF2-40B4-BE49-F238E27FC236}">
-                <a16:creationId xmlns:a16="http://schemas.microsoft.com/office/drawing/2014/main" id="{B9FAA959-540D-4D58-9EE2-7652DA143D2A}"/>
+                <a16:creationId xmlns:a16="http://schemas.microsoft.com/office/drawing/2014/main" id="{D13CC41D-C7E2-49AC-936F-D5670CB35C31}"/>
               </a:ext>
             </a:extLst>
           </p:cNvPr>
@@ -2436,9 +2437,6 @@
             <a:off x="135744" y="134938"/>
             <a:ext cx="8878862" cy="6019800"/>
           </a:xfrm>
-          <a:prstGeom prst="rect">
-            <a:avLst/>
-          </a:prstGeom>
         </p:spPr>
       </p:pic>
     </p:spTree>
@@ -2455,6 +2453,65 @@
 </file>
 
 <file path=ppt/slides/slide2.xml><?xml version="1.0" encoding="utf-8"?>
+<p:sld xmlns:a="http://schemas.openxmlformats.org/drawingml/2006/main" xmlns:r="http://schemas.openxmlformats.org/officeDocument/2006/relationships" xmlns:p="http://schemas.openxmlformats.org/presentationml/2006/main">
+  <p:cSld>
+    <p:spTree>
+      <p:nvGrpSpPr>
+        <p:cNvPr id="1" name=""/>
+        <p:cNvGrpSpPr/>
+        <p:nvPr/>
+      </p:nvGrpSpPr>
+      <p:grpSpPr>
+        <a:xfrm>
+          <a:off x="0" y="0"/>
+          <a:ext cx="0" cy="0"/>
+          <a:chOff x="0" y="0"/>
+          <a:chExt cx="0" cy="0"/>
+        </a:xfrm>
+      </p:grpSpPr>
+      <p:pic>
+        <p:nvPicPr>
+          <p:cNvPr id="4" name="Content Placeholder 3">
+            <a:extLst>
+              <a:ext uri="{FF2B5EF4-FFF2-40B4-BE49-F238E27FC236}">
+                <a16:creationId xmlns:a16="http://schemas.microsoft.com/office/drawing/2014/main" id="{B4B9BAD2-D662-4D97-8F97-F978FCB12C1E}"/>
+              </a:ext>
+            </a:extLst>
+          </p:cNvPr>
+          <p:cNvPicPr>
+            <a:picLocks noGrp="1" noChangeAspect="1"/>
+          </p:cNvPicPr>
+          <p:nvPr>
+            <p:ph sz="quarter" idx="10"/>
+          </p:nvPr>
+        </p:nvPicPr>
+        <p:blipFill>
+          <a:blip r:embed="rId2"/>
+          <a:stretch>
+            <a:fillRect/>
+          </a:stretch>
+        </p:blipFill>
+        <p:spPr>
+          <a:xfrm>
+            <a:off x="135744" y="134938"/>
+            <a:ext cx="8878862" cy="6019800"/>
+          </a:xfrm>
+        </p:spPr>
+      </p:pic>
+    </p:spTree>
+    <p:extLst>
+      <p:ext uri="{BB962C8B-B14F-4D97-AF65-F5344CB8AC3E}">
+        <p14:creationId xmlns:p14="http://schemas.microsoft.com/office/powerpoint/2010/main" val="3254161151"/>
+      </p:ext>
+    </p:extLst>
+  </p:cSld>
+  <p:clrMapOvr>
+    <a:masterClrMapping/>
+  </p:clrMapOvr>
+</p:sld>
+</file>
+
+<file path=ppt/slides/slide3.xml><?xml version="1.0" encoding="utf-8"?>
 <p:sld xmlns:a="http://schemas.openxmlformats.org/drawingml/2006/main" xmlns:r="http://schemas.openxmlformats.org/officeDocument/2006/relationships" xmlns:p="http://schemas.openxmlformats.org/presentationml/2006/main">
   <p:cSld>
     <p:spTree>

</xml_diff>